<commit_message>
DeveloperGuide: Updated diagram for model component
</commit_message>
<xml_diff>
--- a/docs/diagrams/ModelComponentClassBetterOopDiagram.pptx
+++ b/docs/diagrams/ModelComponentClassBetterOopDiagram.pptx
@@ -208,7 +208,7 @@
           <a:p>
             <a:fld id="{F5CC4B3F-88C1-4FFA-B1B6-F41C21DC6924}" type="datetimeFigureOut">
               <a:rPr lang="en-US" smtClean="0"/>
-              <a:t>12/5/2018</a:t>
+              <a:t>04-Apr-19</a:t>
             </a:fld>
             <a:endParaRPr lang="en-US"/>
           </a:p>
@@ -654,7 +654,7 @@
           <a:p>
             <a:fld id="{78C97017-6FC3-485B-9764-EAC9E56C1D49}" type="datetimeFigureOut">
               <a:rPr lang="en-US" smtClean="0"/>
-              <a:t>12/5/2018</a:t>
+              <a:t>04-Apr-19</a:t>
             </a:fld>
             <a:endParaRPr lang="en-US"/>
           </a:p>
@@ -822,7 +822,7 @@
           <a:p>
             <a:fld id="{78C97017-6FC3-485B-9764-EAC9E56C1D49}" type="datetimeFigureOut">
               <a:rPr lang="en-US" smtClean="0"/>
-              <a:t>12/5/2018</a:t>
+              <a:t>04-Apr-19</a:t>
             </a:fld>
             <a:endParaRPr lang="en-US"/>
           </a:p>
@@ -1000,7 +1000,7 @@
           <a:p>
             <a:fld id="{78C97017-6FC3-485B-9764-EAC9E56C1D49}" type="datetimeFigureOut">
               <a:rPr lang="en-US" smtClean="0"/>
-              <a:t>12/5/2018</a:t>
+              <a:t>04-Apr-19</a:t>
             </a:fld>
             <a:endParaRPr lang="en-US"/>
           </a:p>
@@ -1168,7 +1168,7 @@
           <a:p>
             <a:fld id="{78C97017-6FC3-485B-9764-EAC9E56C1D49}" type="datetimeFigureOut">
               <a:rPr lang="en-US" smtClean="0"/>
-              <a:t>12/5/2018</a:t>
+              <a:t>04-Apr-19</a:t>
             </a:fld>
             <a:endParaRPr lang="en-US"/>
           </a:p>
@@ -1413,7 +1413,7 @@
           <a:p>
             <a:fld id="{78C97017-6FC3-485B-9764-EAC9E56C1D49}" type="datetimeFigureOut">
               <a:rPr lang="en-US" smtClean="0"/>
-              <a:t>12/5/2018</a:t>
+              <a:t>04-Apr-19</a:t>
             </a:fld>
             <a:endParaRPr lang="en-US"/>
           </a:p>
@@ -1698,7 +1698,7 @@
           <a:p>
             <a:fld id="{78C97017-6FC3-485B-9764-EAC9E56C1D49}" type="datetimeFigureOut">
               <a:rPr lang="en-US" smtClean="0"/>
-              <a:t>12/5/2018</a:t>
+              <a:t>04-Apr-19</a:t>
             </a:fld>
             <a:endParaRPr lang="en-US"/>
           </a:p>
@@ -2117,7 +2117,7 @@
           <a:p>
             <a:fld id="{78C97017-6FC3-485B-9764-EAC9E56C1D49}" type="datetimeFigureOut">
               <a:rPr lang="en-US" smtClean="0"/>
-              <a:t>12/5/2018</a:t>
+              <a:t>04-Apr-19</a:t>
             </a:fld>
             <a:endParaRPr lang="en-US"/>
           </a:p>
@@ -2234,7 +2234,7 @@
           <a:p>
             <a:fld id="{78C97017-6FC3-485B-9764-EAC9E56C1D49}" type="datetimeFigureOut">
               <a:rPr lang="en-US" smtClean="0"/>
-              <a:t>12/5/2018</a:t>
+              <a:t>04-Apr-19</a:t>
             </a:fld>
             <a:endParaRPr lang="en-US"/>
           </a:p>
@@ -2329,7 +2329,7 @@
           <a:p>
             <a:fld id="{78C97017-6FC3-485B-9764-EAC9E56C1D49}" type="datetimeFigureOut">
               <a:rPr lang="en-US" smtClean="0"/>
-              <a:t>12/5/2018</a:t>
+              <a:t>04-Apr-19</a:t>
             </a:fld>
             <a:endParaRPr lang="en-US"/>
           </a:p>
@@ -2604,7 +2604,7 @@
           <a:p>
             <a:fld id="{78C97017-6FC3-485B-9764-EAC9E56C1D49}" type="datetimeFigureOut">
               <a:rPr lang="en-US" smtClean="0"/>
-              <a:t>12/5/2018</a:t>
+              <a:t>04-Apr-19</a:t>
             </a:fld>
             <a:endParaRPr lang="en-US"/>
           </a:p>
@@ -2856,7 +2856,7 @@
           <a:p>
             <a:fld id="{78C97017-6FC3-485B-9764-EAC9E56C1D49}" type="datetimeFigureOut">
               <a:rPr lang="en-US" smtClean="0"/>
-              <a:t>12/5/2018</a:t>
+              <a:t>04-Apr-19</a:t>
             </a:fld>
             <a:endParaRPr lang="en-US"/>
           </a:p>
@@ -3067,7 +3067,7 @@
           <a:p>
             <a:fld id="{78C97017-6FC3-485B-9764-EAC9E56C1D49}" type="datetimeFigureOut">
               <a:rPr lang="en-US" smtClean="0"/>
-              <a:t>12/5/2018</a:t>
+              <a:t>04-Apr-19</a:t>
             </a:fld>
             <a:endParaRPr lang="en-US"/>
           </a:p>
@@ -3450,7 +3450,7 @@
         </p:nvSpPr>
         <p:spPr>
           <a:xfrm>
-            <a:off x="1754912" y="3324621"/>
+            <a:off x="1197129" y="2643845"/>
             <a:ext cx="1447688" cy="346760"/>
           </a:xfrm>
           <a:prstGeom prst="rect">
@@ -3483,12 +3483,12 @@
           <a:p>
             <a:pPr algn="ctr"/>
             <a:r>
-              <a:rPr lang="en-US" sz="1050" dirty="0" err="1">
+              <a:rPr lang="en-US" sz="1050" dirty="0">
                 <a:solidFill>
                   <a:srgbClr val="7030A0"/>
                 </a:solidFill>
               </a:rPr>
-              <a:t>VersionedAddressBook</a:t>
+              <a:t>VersionedTaskBook</a:t>
             </a:r>
             <a:endParaRPr lang="en-SG" sz="1050" dirty="0">
               <a:solidFill>
@@ -3506,7 +3506,7 @@
         </p:nvSpPr>
         <p:spPr>
           <a:xfrm>
-            <a:off x="3730715" y="3353144"/>
+            <a:off x="3172932" y="2672368"/>
             <a:ext cx="1156969" cy="346760"/>
           </a:xfrm>
           <a:prstGeom prst="rect">
@@ -3539,12 +3539,12 @@
           <a:p>
             <a:pPr algn="ctr"/>
             <a:r>
-              <a:rPr lang="en-US" sz="1050" dirty="0" err="1">
+              <a:rPr lang="en-US" sz="1050" dirty="0">
                 <a:solidFill>
                   <a:srgbClr val="7030A0"/>
                 </a:solidFill>
               </a:rPr>
-              <a:t>UniquePersonList</a:t>
+              <a:t>UniqueTaskList</a:t>
             </a:r>
             <a:endParaRPr lang="en-SG" sz="1050" dirty="0">
               <a:solidFill>
@@ -3562,7 +3562,7 @@
         </p:nvSpPr>
         <p:spPr>
           <a:xfrm>
-            <a:off x="3201752" y="3437911"/>
+            <a:off x="2643969" y="2757135"/>
             <a:ext cx="236048" cy="173380"/>
           </a:xfrm>
           <a:prstGeom prst="flowChartDecision">
@@ -3605,17 +3605,18 @@
         <p:nvCxnSpPr>
           <p:cNvPr id="30" name="Elbow Connector 29"/>
           <p:cNvCxnSpPr>
-            <a:stCxn id="51" idx="3"/>
+            <a:cxnSpLocks/>
+            <a:stCxn id="54" idx="0"/>
             <a:endCxn id="49" idx="1"/>
           </p:cNvCxnSpPr>
           <p:nvPr/>
         </p:nvCxnSpPr>
         <p:spPr>
-          <a:xfrm>
-            <a:off x="3437800" y="3524601"/>
-            <a:ext cx="292915" cy="1923"/>
-          </a:xfrm>
-          <a:prstGeom prst="bentConnector3">
+          <a:xfrm rot="5400000" flipH="1" flipV="1">
+            <a:off x="2990603" y="2685469"/>
+            <a:ext cx="22050" cy="342608"/>
+          </a:xfrm>
+          <a:prstGeom prst="bentConnector2">
             <a:avLst/>
           </a:prstGeom>
           <a:ln w="19050">
@@ -3650,7 +3651,7 @@
         </p:nvSpPr>
         <p:spPr>
           <a:xfrm>
-            <a:off x="5282183" y="3347776"/>
+            <a:off x="4724400" y="2667000"/>
             <a:ext cx="708186" cy="346760"/>
           </a:xfrm>
           <a:prstGeom prst="rect">
@@ -3688,7 +3689,7 @@
                   <a:srgbClr val="7030A0"/>
                 </a:solidFill>
               </a:rPr>
-              <a:t>Person</a:t>
+              <a:t>Task</a:t>
             </a:r>
             <a:endParaRPr lang="en-SG" sz="1050" dirty="0">
               <a:solidFill>
@@ -3706,7 +3707,7 @@
         </p:nvSpPr>
         <p:spPr>
           <a:xfrm>
-            <a:off x="4886966" y="3430775"/>
+            <a:off x="4329183" y="2755900"/>
             <a:ext cx="236048" cy="173380"/>
           </a:xfrm>
           <a:prstGeom prst="flowChartDecision">
@@ -3754,9 +3755,9 @@
           <p:nvPr/>
         </p:nvCxnSpPr>
         <p:spPr>
-          <a:xfrm>
-            <a:off x="5123014" y="3517465"/>
-            <a:ext cx="159169" cy="3691"/>
+          <a:xfrm flipV="1">
+            <a:off x="4565231" y="2840380"/>
+            <a:ext cx="159169" cy="2210"/>
           </a:xfrm>
           <a:prstGeom prst="bentConnector3">
             <a:avLst/>
@@ -3793,8 +3794,8 @@
         </p:nvSpPr>
         <p:spPr>
           <a:xfrm>
-            <a:off x="6680903" y="3053948"/>
-            <a:ext cx="708186" cy="285783"/>
+            <a:off x="6213389" y="1730012"/>
+            <a:ext cx="874528" cy="285783"/>
           </a:xfrm>
           <a:prstGeom prst="rect">
             <a:avLst/>
@@ -3849,7 +3850,7 @@
         </p:nvSpPr>
         <p:spPr>
           <a:xfrm>
-            <a:off x="6010453" y="3437911"/>
+            <a:off x="5452670" y="2757135"/>
             <a:ext cx="236048" cy="173380"/>
           </a:xfrm>
           <a:prstGeom prst="flowChartDecision">
@@ -3897,11 +3898,11 @@
           <p:nvPr/>
         </p:nvCxnSpPr>
         <p:spPr>
-          <a:xfrm flipV="1">
-            <a:off x="6246501" y="3196531"/>
-            <a:ext cx="434402" cy="327761"/>
-          </a:xfrm>
-          <a:prstGeom prst="bentConnector3">
+          <a:xfrm rot="5400000" flipH="1" flipV="1">
+            <a:off x="5924579" y="1911617"/>
+            <a:ext cx="319291" cy="282632"/>
+          </a:xfrm>
+          <a:prstGeom prst="bentConnector2">
             <a:avLst/>
           </a:prstGeom>
           <a:ln w="19050">
@@ -3936,8 +3937,8 @@
         </p:nvSpPr>
         <p:spPr>
           <a:xfrm>
-            <a:off x="6680903" y="3376926"/>
-            <a:ext cx="708186" cy="285783"/>
+            <a:off x="6213389" y="2052990"/>
+            <a:ext cx="867269" cy="285783"/>
           </a:xfrm>
           <a:prstGeom prst="rect">
             <a:avLst/>
@@ -3974,7 +3975,7 @@
                   <a:srgbClr val="7030A0"/>
                 </a:solidFill>
               </a:rPr>
-              <a:t>Phone</a:t>
+              <a:t>StartDate</a:t>
             </a:r>
             <a:endParaRPr lang="en-SG" sz="1050" dirty="0">
               <a:solidFill>
@@ -3984,21 +3985,77 @@
           </a:p>
         </p:txBody>
       </p:sp>
+      <p:sp>
+        <p:nvSpPr>
+          <p:cNvPr id="83" name="Rectangle 8"/>
+          <p:cNvSpPr/>
+          <p:nvPr/>
+        </p:nvSpPr>
+        <p:spPr>
+          <a:xfrm>
+            <a:off x="6213390" y="2375968"/>
+            <a:ext cx="867270" cy="285783"/>
+          </a:xfrm>
+          <a:prstGeom prst="rect">
+            <a:avLst/>
+          </a:prstGeom>
+          <a:ln w="19050">
+            <a:solidFill>
+              <a:srgbClr val="7030A0"/>
+            </a:solidFill>
+          </a:ln>
+          <a:effectLst/>
+        </p:spPr>
+        <p:style>
+          <a:lnRef idx="1">
+            <a:schemeClr val="accent4"/>
+          </a:lnRef>
+          <a:fillRef idx="2">
+            <a:schemeClr val="accent4"/>
+          </a:fillRef>
+          <a:effectRef idx="1">
+            <a:schemeClr val="accent4"/>
+          </a:effectRef>
+          <a:fontRef idx="minor">
+            <a:schemeClr val="dk1"/>
+          </a:fontRef>
+        </p:style>
+        <p:txBody>
+          <a:bodyPr rtlCol="0" anchor="ctr"/>
+          <a:lstStyle/>
+          <a:p>
+            <a:pPr algn="ctr"/>
+            <a:r>
+              <a:rPr lang="en-US" sz="1050" dirty="0">
+                <a:solidFill>
+                  <a:srgbClr val="7030A0"/>
+                </a:solidFill>
+              </a:rPr>
+              <a:t>StartTime</a:t>
+            </a:r>
+            <a:endParaRPr lang="en-SG" sz="1050" dirty="0">
+              <a:solidFill>
+                <a:srgbClr val="7030A0"/>
+              </a:solidFill>
+            </a:endParaRPr>
+          </a:p>
+        </p:txBody>
+      </p:sp>
       <p:cxnSp>
         <p:nvCxnSpPr>
-          <p:cNvPr id="81" name="Elbow Connector 80"/>
+          <p:cNvPr id="84" name="Elbow Connector 83"/>
           <p:cNvCxnSpPr>
-            <a:stCxn id="78" idx="3"/>
-            <a:endCxn id="80" idx="1"/>
+            <a:cxnSpLocks/>
+            <a:endCxn id="83" idx="1"/>
           </p:cNvCxnSpPr>
           <p:nvPr/>
         </p:nvCxnSpPr>
         <p:spPr>
-          <a:xfrm flipV="1">
-            <a:off x="6246501" y="3519818"/>
-            <a:ext cx="434402" cy="4783"/>
-          </a:xfrm>
-          <a:prstGeom prst="bentConnector3">
+          <a:xfrm rot="5400000" flipH="1" flipV="1">
+            <a:off x="5912221" y="2549020"/>
+            <a:ext cx="331329" cy="271010"/>
+          </a:xfrm>
+          <a:prstGeom prst="bentConnector2">
             <a:avLst/>
           </a:prstGeom>
           <a:ln w="19050">
@@ -4027,14 +4084,14 @@
       </p:cxnSp>
       <p:sp>
         <p:nvSpPr>
-          <p:cNvPr id="83" name="Rectangle 8"/>
+          <p:cNvPr id="85" name="Rectangle 8"/>
           <p:cNvSpPr/>
           <p:nvPr/>
         </p:nvSpPr>
         <p:spPr>
           <a:xfrm>
-            <a:off x="6680903" y="3699904"/>
-            <a:ext cx="708186" cy="285783"/>
+            <a:off x="6213389" y="2698945"/>
+            <a:ext cx="874527" cy="285783"/>
           </a:xfrm>
           <a:prstGeom prst="rect">
             <a:avLst/>
@@ -4071,7 +4128,7 @@
                   <a:srgbClr val="7030A0"/>
                 </a:solidFill>
               </a:rPr>
-              <a:t>Email</a:t>
+              <a:t>EndDate</a:t>
             </a:r>
             <a:endParaRPr lang="en-SG" sz="1050" dirty="0">
               <a:solidFill>
@@ -4083,17 +4140,16 @@
       </p:sp>
       <p:cxnSp>
         <p:nvCxnSpPr>
-          <p:cNvPr id="84" name="Elbow Connector 83"/>
+          <p:cNvPr id="86" name="Elbow Connector 85"/>
           <p:cNvCxnSpPr>
-            <a:stCxn id="78" idx="3"/>
-            <a:endCxn id="83" idx="1"/>
+            <a:cxnSpLocks/>
           </p:cNvCxnSpPr>
           <p:nvPr/>
         </p:nvCxnSpPr>
         <p:spPr>
-          <a:xfrm>
-            <a:off x="6246501" y="3524601"/>
-            <a:ext cx="434402" cy="318195"/>
+          <a:xfrm flipV="1">
+            <a:off x="5709840" y="2841207"/>
+            <a:ext cx="524671" cy="1988"/>
           </a:xfrm>
           <a:prstGeom prst="bentConnector3">
             <a:avLst/>
@@ -4124,14 +4180,98 @@
       </p:cxnSp>
       <p:sp>
         <p:nvSpPr>
-          <p:cNvPr id="85" name="Rectangle 8"/>
+          <p:cNvPr id="54" name="TextBox 53"/>
+          <p:cNvSpPr txBox="1"/>
+          <p:nvPr/>
+        </p:nvSpPr>
+        <p:spPr>
+          <a:xfrm>
+            <a:off x="2735695" y="2867798"/>
+            <a:ext cx="189257" cy="178683"/>
+          </a:xfrm>
+          <a:prstGeom prst="rect">
+            <a:avLst/>
+          </a:prstGeom>
+          <a:noFill/>
+        </p:spPr>
+        <p:txBody>
+          <a:bodyPr wrap="square" lIns="0" tIns="0" rIns="0" bIns="0" rtlCol="0">
+            <a:noAutofit/>
+          </a:bodyPr>
+          <a:lstStyle/>
+          <a:p>
+            <a:pPr algn="ctr"/>
+            <a:r>
+              <a:rPr lang="en-US" sz="1100" dirty="0">
+                <a:solidFill>
+                  <a:srgbClr val="7030A0"/>
+                </a:solidFill>
+              </a:rPr>
+              <a:t>1</a:t>
+            </a:r>
+            <a:endParaRPr lang="en-SG" sz="1100" dirty="0">
+              <a:solidFill>
+                <a:srgbClr val="7030A0"/>
+              </a:solidFill>
+            </a:endParaRPr>
+          </a:p>
+        </p:txBody>
+      </p:sp>
+      <p:sp>
+        <p:nvSpPr>
+          <p:cNvPr id="61" name="TextBox 60"/>
+          <p:cNvSpPr txBox="1"/>
+          <p:nvPr/>
+        </p:nvSpPr>
+        <p:spPr>
+          <a:xfrm>
+            <a:off x="4545979" y="2906851"/>
+            <a:ext cx="189257" cy="178683"/>
+          </a:xfrm>
+          <a:prstGeom prst="rect">
+            <a:avLst/>
+          </a:prstGeom>
+          <a:noFill/>
+        </p:spPr>
+        <p:txBody>
+          <a:bodyPr wrap="square" lIns="0" tIns="0" rIns="0" bIns="0" rtlCol="0">
+            <a:noAutofit/>
+          </a:bodyPr>
+          <a:lstStyle/>
+          <a:p>
+            <a:pPr algn="ctr"/>
+            <a:r>
+              <a:rPr lang="en-US" sz="1100" dirty="0">
+                <a:solidFill>
+                  <a:srgbClr val="7030A0"/>
+                </a:solidFill>
+              </a:rPr>
+              <a:t>*</a:t>
+            </a:r>
+            <a:endParaRPr lang="en-SG" sz="1100" dirty="0">
+              <a:solidFill>
+                <a:srgbClr val="7030A0"/>
+              </a:solidFill>
+            </a:endParaRPr>
+          </a:p>
+        </p:txBody>
+      </p:sp>
+      <p:sp>
+        <p:nvSpPr>
+          <p:cNvPr id="52" name="Rectangle 8">
+            <a:extLst>
+              <a:ext uri="{FF2B5EF4-FFF2-40B4-BE49-F238E27FC236}">
+                <a16:creationId xmlns:a16="http://schemas.microsoft.com/office/drawing/2014/main" id="{ABDCDBD2-131A-4B66-A2F2-43BBEE82C773}"/>
+              </a:ext>
+            </a:extLst>
+          </p:cNvPr>
           <p:cNvSpPr/>
           <p:nvPr/>
         </p:nvSpPr>
         <p:spPr>
           <a:xfrm>
-            <a:off x="6680903" y="4022881"/>
-            <a:ext cx="708186" cy="285783"/>
+            <a:off x="3166595" y="2015795"/>
+            <a:ext cx="1156969" cy="285783"/>
           </a:xfrm>
           <a:prstGeom prst="rect">
             <a:avLst/>
@@ -4164,188 +4304,6 @@
             <a:pPr algn="ctr"/>
             <a:r>
               <a:rPr lang="en-US" sz="1050" dirty="0">
-                <a:solidFill>
-                  <a:srgbClr val="7030A0"/>
-                </a:solidFill>
-              </a:rPr>
-              <a:t>Address</a:t>
-            </a:r>
-            <a:endParaRPr lang="en-SG" sz="1050" dirty="0">
-              <a:solidFill>
-                <a:srgbClr val="7030A0"/>
-              </a:solidFill>
-            </a:endParaRPr>
-          </a:p>
-        </p:txBody>
-      </p:sp>
-      <p:cxnSp>
-        <p:nvCxnSpPr>
-          <p:cNvPr id="86" name="Elbow Connector 85"/>
-          <p:cNvCxnSpPr>
-            <a:cxnSpLocks/>
-            <a:stCxn id="78" idx="3"/>
-            <a:endCxn id="85" idx="1"/>
-          </p:cNvCxnSpPr>
-          <p:nvPr/>
-        </p:nvCxnSpPr>
-        <p:spPr>
-          <a:xfrm>
-            <a:off x="6246501" y="3524601"/>
-            <a:ext cx="434402" cy="641172"/>
-          </a:xfrm>
-          <a:prstGeom prst="bentConnector3">
-            <a:avLst/>
-          </a:prstGeom>
-          <a:ln w="19050">
-            <a:solidFill>
-              <a:srgbClr val="7030A0"/>
-            </a:solidFill>
-            <a:headEnd type="none" w="med" len="med"/>
-            <a:tailEnd type="arrow" w="med" len="med"/>
-          </a:ln>
-          <a:effectLst/>
-        </p:spPr>
-        <p:style>
-          <a:lnRef idx="1">
-            <a:schemeClr val="accent2"/>
-          </a:lnRef>
-          <a:fillRef idx="2">
-            <a:schemeClr val="accent2"/>
-          </a:fillRef>
-          <a:effectRef idx="1">
-            <a:schemeClr val="accent2"/>
-          </a:effectRef>
-          <a:fontRef idx="minor">
-            <a:schemeClr val="dk1"/>
-          </a:fontRef>
-        </p:style>
-      </p:cxnSp>
-      <p:sp>
-        <p:nvSpPr>
-          <p:cNvPr id="54" name="TextBox 53"/>
-          <p:cNvSpPr txBox="1"/>
-          <p:nvPr/>
-        </p:nvSpPr>
-        <p:spPr>
-          <a:xfrm>
-            <a:off x="3293478" y="3548574"/>
-            <a:ext cx="189257" cy="178683"/>
-          </a:xfrm>
-          <a:prstGeom prst="rect">
-            <a:avLst/>
-          </a:prstGeom>
-          <a:noFill/>
-        </p:spPr>
-        <p:txBody>
-          <a:bodyPr wrap="square" lIns="0" tIns="0" rIns="0" bIns="0" rtlCol="0">
-            <a:noAutofit/>
-          </a:bodyPr>
-          <a:lstStyle/>
-          <a:p>
-            <a:pPr algn="ctr"/>
-            <a:r>
-              <a:rPr lang="en-US" sz="1100" dirty="0">
-                <a:solidFill>
-                  <a:srgbClr val="7030A0"/>
-                </a:solidFill>
-              </a:rPr>
-              <a:t>1</a:t>
-            </a:r>
-            <a:endParaRPr lang="en-SG" sz="1100" dirty="0">
-              <a:solidFill>
-                <a:srgbClr val="7030A0"/>
-              </a:solidFill>
-            </a:endParaRPr>
-          </a:p>
-        </p:txBody>
-      </p:sp>
-      <p:sp>
-        <p:nvSpPr>
-          <p:cNvPr id="61" name="TextBox 60"/>
-          <p:cNvSpPr txBox="1"/>
-          <p:nvPr/>
-        </p:nvSpPr>
-        <p:spPr>
-          <a:xfrm>
-            <a:off x="5103762" y="3587627"/>
-            <a:ext cx="189257" cy="178683"/>
-          </a:xfrm>
-          <a:prstGeom prst="rect">
-            <a:avLst/>
-          </a:prstGeom>
-          <a:noFill/>
-        </p:spPr>
-        <p:txBody>
-          <a:bodyPr wrap="square" lIns="0" tIns="0" rIns="0" bIns="0" rtlCol="0">
-            <a:noAutofit/>
-          </a:bodyPr>
-          <a:lstStyle/>
-          <a:p>
-            <a:pPr algn="ctr"/>
-            <a:r>
-              <a:rPr lang="en-US" sz="1100" dirty="0">
-                <a:solidFill>
-                  <a:srgbClr val="7030A0"/>
-                </a:solidFill>
-              </a:rPr>
-              <a:t>*</a:t>
-            </a:r>
-            <a:endParaRPr lang="en-SG" sz="1100" dirty="0">
-              <a:solidFill>
-                <a:srgbClr val="7030A0"/>
-              </a:solidFill>
-            </a:endParaRPr>
-          </a:p>
-        </p:txBody>
-      </p:sp>
-      <p:sp>
-        <p:nvSpPr>
-          <p:cNvPr id="52" name="Rectangle 8">
-            <a:extLst>
-              <a:ext uri="{FF2B5EF4-FFF2-40B4-BE49-F238E27FC236}">
-                <a16:creationId xmlns:a16="http://schemas.microsoft.com/office/drawing/2014/main" id="{ABDCDBD2-131A-4B66-A2F2-43BBEE82C773}"/>
-              </a:ext>
-            </a:extLst>
-          </p:cNvPr>
-          <p:cNvSpPr/>
-          <p:nvPr/>
-        </p:nvSpPr>
-        <p:spPr>
-          <a:xfrm>
-            <a:off x="3724378" y="2696571"/>
-            <a:ext cx="1156969" cy="285783"/>
-          </a:xfrm>
-          <a:prstGeom prst="rect">
-            <a:avLst/>
-          </a:prstGeom>
-          <a:ln w="19050">
-            <a:solidFill>
-              <a:srgbClr val="7030A0"/>
-            </a:solidFill>
-          </a:ln>
-          <a:effectLst/>
-        </p:spPr>
-        <p:style>
-          <a:lnRef idx="1">
-            <a:schemeClr val="accent4"/>
-          </a:lnRef>
-          <a:fillRef idx="2">
-            <a:schemeClr val="accent4"/>
-          </a:fillRef>
-          <a:effectRef idx="1">
-            <a:schemeClr val="accent4"/>
-          </a:effectRef>
-          <a:fontRef idx="minor">
-            <a:schemeClr val="dk1"/>
-          </a:fontRef>
-        </p:style>
-        <p:txBody>
-          <a:bodyPr rtlCol="0" anchor="ctr"/>
-          <a:lstStyle/>
-          <a:p>
-            <a:pPr algn="ctr"/>
-            <a:r>
-              <a:rPr lang="en-US" sz="1050" dirty="0" err="1">
                 <a:solidFill>
                   <a:srgbClr val="7030A0"/>
                 </a:solidFill>
@@ -4378,7 +4336,7 @@
         </p:nvCxnSpPr>
         <p:spPr>
           <a:xfrm rot="5400000" flipH="1" flipV="1">
-            <a:off x="3201687" y="3025884"/>
+            <a:off x="2643904" y="2345108"/>
             <a:ext cx="709111" cy="336271"/>
           </a:xfrm>
           <a:prstGeom prst="bentConnector2">
@@ -4422,7 +4380,7 @@
         </p:nvSpPr>
         <p:spPr>
           <a:xfrm>
-            <a:off x="5682850" y="2920431"/>
+            <a:off x="5125067" y="2239655"/>
             <a:ext cx="189257" cy="178683"/>
           </a:xfrm>
           <a:prstGeom prst="rect">
@@ -4467,7 +4425,7 @@
         </p:nvSpPr>
         <p:spPr>
           <a:xfrm rot="16200000">
-            <a:off x="5521988" y="3154431"/>
+            <a:off x="4964205" y="2473655"/>
             <a:ext cx="236048" cy="173380"/>
           </a:xfrm>
           <a:prstGeom prst="flowChartDecision">
@@ -4515,16 +4473,17 @@
           </p:cNvPr>
           <p:cNvCxnSpPr>
             <a:cxnSpLocks/>
+            <a:stCxn id="71" idx="0"/>
             <a:endCxn id="67" idx="1"/>
           </p:cNvCxnSpPr>
           <p:nvPr/>
         </p:nvCxnSpPr>
         <p:spPr>
-          <a:xfrm flipV="1">
-            <a:off x="4852786" y="2722716"/>
-            <a:ext cx="432916" cy="111294"/>
-          </a:xfrm>
-          <a:prstGeom prst="bentConnector3">
+          <a:xfrm rot="5400000" flipH="1" flipV="1">
+            <a:off x="4569460" y="1906207"/>
+            <a:ext cx="22725" cy="294193"/>
+          </a:xfrm>
+          <a:prstGeom prst="bentConnector2">
             <a:avLst/>
           </a:prstGeom>
           <a:ln w="19050">
@@ -4565,7 +4524,7 @@
         </p:nvSpPr>
         <p:spPr>
           <a:xfrm>
-            <a:off x="5285702" y="2549336"/>
+            <a:off x="4727919" y="1868560"/>
             <a:ext cx="708186" cy="346760"/>
           </a:xfrm>
           <a:prstGeom prst="rect">
@@ -4627,7 +4586,7 @@
         </p:nvSpPr>
         <p:spPr>
           <a:xfrm>
-            <a:off x="5103762" y="2767724"/>
+            <a:off x="4545979" y="2086948"/>
             <a:ext cx="189257" cy="178683"/>
           </a:xfrm>
           <a:prstGeom prst="rect">
@@ -4672,7 +4631,7 @@
         </p:nvSpPr>
         <p:spPr>
           <a:xfrm>
-            <a:off x="3335606" y="2662682"/>
+            <a:off x="2777823" y="1981906"/>
             <a:ext cx="189257" cy="178683"/>
           </a:xfrm>
           <a:prstGeom prst="rect">
@@ -4717,7 +4676,7 @@
         </p:nvSpPr>
         <p:spPr>
           <a:xfrm>
-            <a:off x="4879835" y="2751791"/>
+            <a:off x="4315702" y="2064665"/>
             <a:ext cx="236048" cy="173380"/>
           </a:xfrm>
           <a:prstGeom prst="flowChartDecision">
@@ -4774,13 +4733,385 @@
         </p:nvCxnSpPr>
         <p:spPr>
           <a:xfrm rot="16200000" flipV="1">
-            <a:off x="5526404" y="3009488"/>
+            <a:off x="4968621" y="2328712"/>
             <a:ext cx="227001" cy="217"/>
           </a:xfrm>
           <a:prstGeom prst="bentConnector3">
             <a:avLst>
               <a:gd name="adj1" fmla="val 50000"/>
             </a:avLst>
+          </a:prstGeom>
+          <a:ln w="19050">
+            <a:solidFill>
+              <a:srgbClr val="7030A0"/>
+            </a:solidFill>
+            <a:headEnd type="none" w="med" len="med"/>
+            <a:tailEnd type="arrow" w="med" len="med"/>
+          </a:ln>
+          <a:effectLst/>
+        </p:spPr>
+        <p:style>
+          <a:lnRef idx="1">
+            <a:schemeClr val="accent2"/>
+          </a:lnRef>
+          <a:fillRef idx="2">
+            <a:schemeClr val="accent2"/>
+          </a:fillRef>
+          <a:effectRef idx="1">
+            <a:schemeClr val="accent2"/>
+          </a:effectRef>
+          <a:fontRef idx="minor">
+            <a:schemeClr val="dk1"/>
+          </a:fontRef>
+        </p:style>
+      </p:cxnSp>
+      <p:sp>
+        <p:nvSpPr>
+          <p:cNvPr id="35" name="Rectangle 8">
+            <a:extLst>
+              <a:ext uri="{FF2B5EF4-FFF2-40B4-BE49-F238E27FC236}">
+                <a16:creationId xmlns:a16="http://schemas.microsoft.com/office/drawing/2014/main" id="{5ECC99A5-A008-4EBB-BDC5-8838BADE54CA}"/>
+              </a:ext>
+            </a:extLst>
+          </p:cNvPr>
+          <p:cNvSpPr/>
+          <p:nvPr/>
+        </p:nvSpPr>
+        <p:spPr>
+          <a:xfrm>
+            <a:off x="6213389" y="3021922"/>
+            <a:ext cx="874527" cy="285783"/>
+          </a:xfrm>
+          <a:prstGeom prst="rect">
+            <a:avLst/>
+          </a:prstGeom>
+          <a:ln w="19050">
+            <a:solidFill>
+              <a:srgbClr val="7030A0"/>
+            </a:solidFill>
+          </a:ln>
+          <a:effectLst/>
+        </p:spPr>
+        <p:style>
+          <a:lnRef idx="1">
+            <a:schemeClr val="accent4"/>
+          </a:lnRef>
+          <a:fillRef idx="2">
+            <a:schemeClr val="accent4"/>
+          </a:fillRef>
+          <a:effectRef idx="1">
+            <a:schemeClr val="accent4"/>
+          </a:effectRef>
+          <a:fontRef idx="minor">
+            <a:schemeClr val="dk1"/>
+          </a:fontRef>
+        </p:style>
+        <p:txBody>
+          <a:bodyPr rtlCol="0" anchor="ctr"/>
+          <a:lstStyle/>
+          <a:p>
+            <a:pPr algn="ctr"/>
+            <a:r>
+              <a:rPr lang="en-US" sz="1050" dirty="0">
+                <a:solidFill>
+                  <a:srgbClr val="7030A0"/>
+                </a:solidFill>
+              </a:rPr>
+              <a:t>EndTime</a:t>
+            </a:r>
+            <a:endParaRPr lang="en-SG" sz="1050" dirty="0">
+              <a:solidFill>
+                <a:srgbClr val="7030A0"/>
+              </a:solidFill>
+            </a:endParaRPr>
+          </a:p>
+        </p:txBody>
+      </p:sp>
+      <p:cxnSp>
+        <p:nvCxnSpPr>
+          <p:cNvPr id="43" name="Elbow Connector 80">
+            <a:extLst>
+              <a:ext uri="{FF2B5EF4-FFF2-40B4-BE49-F238E27FC236}">
+                <a16:creationId xmlns:a16="http://schemas.microsoft.com/office/drawing/2014/main" id="{E2F5B291-7EDB-4991-81CD-8AF3ED27F099}"/>
+              </a:ext>
+            </a:extLst>
+          </p:cNvPr>
+          <p:cNvCxnSpPr>
+            <a:cxnSpLocks/>
+            <a:endCxn id="35" idx="1"/>
+          </p:cNvCxnSpPr>
+          <p:nvPr/>
+        </p:nvCxnSpPr>
+        <p:spPr>
+          <a:xfrm rot="16200000" flipH="1">
+            <a:off x="5916398" y="2867823"/>
+            <a:ext cx="322980" cy="271002"/>
+          </a:xfrm>
+          <a:prstGeom prst="bentConnector2">
+            <a:avLst/>
+          </a:prstGeom>
+          <a:ln w="19050">
+            <a:solidFill>
+              <a:srgbClr val="7030A0"/>
+            </a:solidFill>
+            <a:headEnd type="none" w="med" len="med"/>
+            <a:tailEnd type="arrow" w="med" len="med"/>
+          </a:ln>
+          <a:effectLst/>
+        </p:spPr>
+        <p:style>
+          <a:lnRef idx="1">
+            <a:schemeClr val="accent2"/>
+          </a:lnRef>
+          <a:fillRef idx="2">
+            <a:schemeClr val="accent2"/>
+          </a:fillRef>
+          <a:effectRef idx="1">
+            <a:schemeClr val="accent2"/>
+          </a:effectRef>
+          <a:fontRef idx="minor">
+            <a:schemeClr val="dk1"/>
+          </a:fontRef>
+        </p:style>
+      </p:cxnSp>
+      <p:sp>
+        <p:nvSpPr>
+          <p:cNvPr id="57" name="Rectangle 8">
+            <a:extLst>
+              <a:ext uri="{FF2B5EF4-FFF2-40B4-BE49-F238E27FC236}">
+                <a16:creationId xmlns:a16="http://schemas.microsoft.com/office/drawing/2014/main" id="{F5DBDF97-7C1B-4932-BD8E-22C9362F425B}"/>
+              </a:ext>
+            </a:extLst>
+          </p:cNvPr>
+          <p:cNvSpPr/>
+          <p:nvPr/>
+        </p:nvSpPr>
+        <p:spPr>
+          <a:xfrm>
+            <a:off x="6216070" y="3340107"/>
+            <a:ext cx="874527" cy="285783"/>
+          </a:xfrm>
+          <a:prstGeom prst="rect">
+            <a:avLst/>
+          </a:prstGeom>
+          <a:ln w="19050">
+            <a:solidFill>
+              <a:srgbClr val="7030A0"/>
+            </a:solidFill>
+          </a:ln>
+          <a:effectLst/>
+        </p:spPr>
+        <p:style>
+          <a:lnRef idx="1">
+            <a:schemeClr val="accent4"/>
+          </a:lnRef>
+          <a:fillRef idx="2">
+            <a:schemeClr val="accent4"/>
+          </a:fillRef>
+          <a:effectRef idx="1">
+            <a:schemeClr val="accent4"/>
+          </a:effectRef>
+          <a:fontRef idx="minor">
+            <a:schemeClr val="dk1"/>
+          </a:fontRef>
+        </p:style>
+        <p:txBody>
+          <a:bodyPr rtlCol="0" anchor="ctr"/>
+          <a:lstStyle/>
+          <a:p>
+            <a:pPr algn="ctr"/>
+            <a:r>
+              <a:rPr lang="en-US" sz="1050" dirty="0">
+                <a:solidFill>
+                  <a:srgbClr val="7030A0"/>
+                </a:solidFill>
+              </a:rPr>
+              <a:t>Description</a:t>
+            </a:r>
+            <a:endParaRPr lang="en-SG" sz="1050" dirty="0">
+              <a:solidFill>
+                <a:srgbClr val="7030A0"/>
+              </a:solidFill>
+            </a:endParaRPr>
+          </a:p>
+        </p:txBody>
+      </p:sp>
+      <p:cxnSp>
+        <p:nvCxnSpPr>
+          <p:cNvPr id="58" name="Elbow Connector 80">
+            <a:extLst>
+              <a:ext uri="{FF2B5EF4-FFF2-40B4-BE49-F238E27FC236}">
+                <a16:creationId xmlns:a16="http://schemas.microsoft.com/office/drawing/2014/main" id="{D06C3B04-9FF4-4D05-8700-E4417E907820}"/>
+              </a:ext>
+            </a:extLst>
+          </p:cNvPr>
+          <p:cNvCxnSpPr>
+            <a:cxnSpLocks/>
+            <a:endCxn id="57" idx="1"/>
+          </p:cNvCxnSpPr>
+          <p:nvPr/>
+        </p:nvCxnSpPr>
+        <p:spPr>
+          <a:xfrm rot="16200000" flipH="1">
+            <a:off x="5922053" y="3188982"/>
+            <a:ext cx="314344" cy="273690"/>
+          </a:xfrm>
+          <a:prstGeom prst="bentConnector2">
+            <a:avLst/>
+          </a:prstGeom>
+          <a:ln w="19050">
+            <a:solidFill>
+              <a:srgbClr val="7030A0"/>
+            </a:solidFill>
+            <a:headEnd type="none" w="med" len="med"/>
+            <a:tailEnd type="arrow" w="med" len="med"/>
+          </a:ln>
+          <a:effectLst/>
+        </p:spPr>
+        <p:style>
+          <a:lnRef idx="1">
+            <a:schemeClr val="accent2"/>
+          </a:lnRef>
+          <a:fillRef idx="2">
+            <a:schemeClr val="accent2"/>
+          </a:fillRef>
+          <a:effectRef idx="1">
+            <a:schemeClr val="accent2"/>
+          </a:effectRef>
+          <a:fontRef idx="minor">
+            <a:schemeClr val="dk1"/>
+          </a:fontRef>
+        </p:style>
+      </p:cxnSp>
+      <p:sp>
+        <p:nvSpPr>
+          <p:cNvPr id="70" name="Rectangle 8">
+            <a:extLst>
+              <a:ext uri="{FF2B5EF4-FFF2-40B4-BE49-F238E27FC236}">
+                <a16:creationId xmlns:a16="http://schemas.microsoft.com/office/drawing/2014/main" id="{FBB13B21-21A9-47FF-B990-874DEAAE15FC}"/>
+              </a:ext>
+            </a:extLst>
+          </p:cNvPr>
+          <p:cNvSpPr/>
+          <p:nvPr/>
+        </p:nvSpPr>
+        <p:spPr>
+          <a:xfrm>
+            <a:off x="6224017" y="3661763"/>
+            <a:ext cx="874527" cy="285783"/>
+          </a:xfrm>
+          <a:prstGeom prst="rect">
+            <a:avLst/>
+          </a:prstGeom>
+          <a:ln w="19050">
+            <a:solidFill>
+              <a:srgbClr val="7030A0"/>
+            </a:solidFill>
+          </a:ln>
+          <a:effectLst/>
+        </p:spPr>
+        <p:style>
+          <a:lnRef idx="1">
+            <a:schemeClr val="accent4"/>
+          </a:lnRef>
+          <a:fillRef idx="2">
+            <a:schemeClr val="accent4"/>
+          </a:fillRef>
+          <a:effectRef idx="1">
+            <a:schemeClr val="accent4"/>
+          </a:effectRef>
+          <a:fontRef idx="minor">
+            <a:schemeClr val="dk1"/>
+          </a:fontRef>
+        </p:style>
+        <p:txBody>
+          <a:bodyPr rtlCol="0" anchor="ctr"/>
+          <a:lstStyle/>
+          <a:p>
+            <a:pPr algn="ctr"/>
+            <a:r>
+              <a:rPr lang="en-US" sz="1050" dirty="0">
+                <a:solidFill>
+                  <a:srgbClr val="7030A0"/>
+                </a:solidFill>
+              </a:rPr>
+              <a:t>Category</a:t>
+            </a:r>
+            <a:endParaRPr lang="en-SG" sz="1050" dirty="0">
+              <a:solidFill>
+                <a:srgbClr val="7030A0"/>
+              </a:solidFill>
+            </a:endParaRPr>
+          </a:p>
+        </p:txBody>
+      </p:sp>
+      <p:cxnSp>
+        <p:nvCxnSpPr>
+          <p:cNvPr id="73" name="Elbow Connector 80">
+            <a:extLst>
+              <a:ext uri="{FF2B5EF4-FFF2-40B4-BE49-F238E27FC236}">
+                <a16:creationId xmlns:a16="http://schemas.microsoft.com/office/drawing/2014/main" id="{25E1E781-F8B7-4FF4-9871-FADEDB7070F0}"/>
+              </a:ext>
+            </a:extLst>
+          </p:cNvPr>
+          <p:cNvCxnSpPr>
+            <a:cxnSpLocks/>
+          </p:cNvCxnSpPr>
+          <p:nvPr/>
+        </p:nvCxnSpPr>
+        <p:spPr>
+          <a:xfrm rot="16200000" flipH="1">
+            <a:off x="5920372" y="3501440"/>
+            <a:ext cx="314342" cy="273069"/>
+          </a:xfrm>
+          <a:prstGeom prst="bentConnector2">
+            <a:avLst/>
+          </a:prstGeom>
+          <a:ln w="19050">
+            <a:solidFill>
+              <a:srgbClr val="7030A0"/>
+            </a:solidFill>
+            <a:headEnd type="none" w="med" len="med"/>
+            <a:tailEnd type="arrow" w="med" len="med"/>
+          </a:ln>
+          <a:effectLst/>
+        </p:spPr>
+        <p:style>
+          <a:lnRef idx="1">
+            <a:schemeClr val="accent2"/>
+          </a:lnRef>
+          <a:fillRef idx="2">
+            <a:schemeClr val="accent2"/>
+          </a:fillRef>
+          <a:effectRef idx="1">
+            <a:schemeClr val="accent2"/>
+          </a:effectRef>
+          <a:fontRef idx="minor">
+            <a:schemeClr val="dk1"/>
+          </a:fontRef>
+        </p:style>
+      </p:cxnSp>
+      <p:cxnSp>
+        <p:nvCxnSpPr>
+          <p:cNvPr id="111" name="Elbow Connector 78">
+            <a:extLst>
+              <a:ext uri="{FF2B5EF4-FFF2-40B4-BE49-F238E27FC236}">
+                <a16:creationId xmlns:a16="http://schemas.microsoft.com/office/drawing/2014/main" id="{9F62537E-38D6-4242-B292-1398D3E62B11}"/>
+              </a:ext>
+            </a:extLst>
+          </p:cNvPr>
+          <p:cNvCxnSpPr>
+            <a:cxnSpLocks/>
+          </p:cNvCxnSpPr>
+          <p:nvPr/>
+        </p:nvCxnSpPr>
+        <p:spPr>
+          <a:xfrm rot="5400000" flipH="1" flipV="1">
+            <a:off x="5924580" y="2221199"/>
+            <a:ext cx="319291" cy="282632"/>
+          </a:xfrm>
+          <a:prstGeom prst="bentConnector2">
+            <a:avLst/>
           </a:prstGeom>
           <a:ln w="19050">
             <a:solidFill>

</xml_diff>